<commit_message>
minor edit to ppt
</commit_message>
<xml_diff>
--- a/ML5G-PS-012-Xdding-Presentation.pptx
+++ b/ML5G-PS-012-Xdding-Presentation.pptx
@@ -12912,7 +12912,7 @@
         <p:spPr>
           <a:xfrm>
             <a:off x="494430" y="989475"/>
-            <a:ext cx="8030745" cy="2869461"/>
+            <a:ext cx="8030745" cy="3507024"/>
           </a:xfrm>
         </p:spPr>
         <p:txBody>
@@ -12920,7 +12920,13 @@
           <a:lstStyle/>
           <a:p>
             <a:r>
-              <a:rPr lang="en-US" sz="2800" dirty="0"/>
+              <a:rPr lang="en-US" sz="2400" dirty="0"/>
+              <a:t>Multivariate Time Series Classification (MTSC) Problem</a:t>
+            </a:r>
+          </a:p>
+          <a:p>
+            <a:r>
+              <a:rPr lang="en-US" sz="2400" dirty="0"/>
               <a:t>Experiments Show Two Promising Model Architectures:</a:t>
             </a:r>
           </a:p>
@@ -12930,7 +12936,7 @@
               <a:buAutoNum type="romanUcPeriod"/>
             </a:pPr>
             <a:r>
-              <a:rPr lang="en-US" sz="2000" dirty="0"/>
+              <a:rPr lang="en-US" sz="1800" dirty="0"/>
               <a:t>Data Preprocessing Pipeline + Long Short Term Memory Recurrent Neural Network (LSTM RNN)</a:t>
             </a:r>
           </a:p>
@@ -12940,7 +12946,7 @@
               <a:buAutoNum type="romanUcPeriod"/>
             </a:pPr>
             <a:r>
-              <a:rPr lang="en-US" sz="2000" dirty="0"/>
+              <a:rPr lang="en-US" sz="1800" dirty="0"/>
               <a:t>No Preprocessing + TSFresh Library + PCA + XGBoost</a:t>
             </a:r>
           </a:p>

</xml_diff>